<commit_message>
modified:   docs/Threat Modeling Status Update-20140220.pptx 	new file:   docs/Threat Modeling Status Update-20140223.pptx 	modified:   models/ThreatPIM/THREAT-UML.mdzip 	new file:   models/ThreatPIM/THREAT-UML.mdzip.bak 	renamed:    models/ThreatPIM/THREAT-UML.mdzip -> models/ThreatPIM/THREAT-UML.mdzip_pre17.0.5.mdzip.bak 	new file:   usecases/Threat Modeling Use Case-20140224.docx
</commit_message>
<xml_diff>
--- a/docs/Threat Modeling Status Update-20140220.pptx
+++ b/docs/Threat Modeling Status Update-20140220.pptx
@@ -2388,54 +2388,54 @@
     </dgm:pt>
   </dgm:ptLst>
   <dgm:cxnLst>
+    <dgm:cxn modelId="{4B4AAD8F-E5A0-DA48-B301-472AEBDBC7FB}" srcId="{24FC4B7B-0304-B442-8D70-451D2E1B8E73}" destId="{1767A8FE-7DA6-7E4C-887E-346CB8179756}" srcOrd="2" destOrd="0" parTransId="{2DDC1B06-FAEB-6A43-992D-DAD87D34308F}" sibTransId="{DFB1E95F-91DF-774E-9B05-080225A4EB9C}"/>
+    <dgm:cxn modelId="{E3016297-1490-E04B-9930-9DEE63D2F6CF}" type="presOf" srcId="{605B3D90-CD4C-FE46-A788-086A46EEE1EF}" destId="{DDAE6EA9-32C1-4A49-8282-526E58DB176B}" srcOrd="0" destOrd="0" presId="urn:microsoft.com/office/officeart/2005/8/layout/orgChart1"/>
+    <dgm:cxn modelId="{E63139CD-26DF-CB42-9132-40109218E780}" type="presOf" srcId="{1767A8FE-7DA6-7E4C-887E-346CB8179756}" destId="{4AA15F4B-8DC5-CC44-8FB8-A0FA95AA20B0}" srcOrd="1" destOrd="0" presId="urn:microsoft.com/office/officeart/2005/8/layout/orgChart1"/>
+    <dgm:cxn modelId="{09A8B472-6259-7E4E-A66B-24776F2E6E85}" type="presOf" srcId="{2EE9FA59-1494-BA43-AF80-705EA5EFAB8A}" destId="{BA486349-E536-5540-AB6E-2424986D4063}" srcOrd="1" destOrd="0" presId="urn:microsoft.com/office/officeart/2005/8/layout/orgChart1"/>
+    <dgm:cxn modelId="{06C45E1D-83BF-944D-A305-69D6467FCECF}" type="presOf" srcId="{1767A8FE-7DA6-7E4C-887E-346CB8179756}" destId="{516267D5-8BC8-6B43-941A-85AC1C9C19A6}" srcOrd="0" destOrd="0" presId="urn:microsoft.com/office/officeart/2005/8/layout/orgChart1"/>
+    <dgm:cxn modelId="{926EB50A-7DCD-C547-B453-FAC73F176245}" type="presOf" srcId="{8BCD8603-B6B5-A247-A01F-7FA97AF262D7}" destId="{BF32D8EB-9D41-6C42-A5DA-166765D5458D}" srcOrd="0" destOrd="0" presId="urn:microsoft.com/office/officeart/2005/8/layout/orgChart1"/>
+    <dgm:cxn modelId="{47581894-442F-E647-B01B-641FBD6FC933}" type="presOf" srcId="{FD54C9EA-011A-534D-AE4D-31375457A9F1}" destId="{ECCBBBF4-F9C9-BE47-ABAF-C182918AA8F9}" srcOrd="1" destOrd="0" presId="urn:microsoft.com/office/officeart/2005/8/layout/orgChart1"/>
+    <dgm:cxn modelId="{4D72B0DD-1AE7-1845-A919-9471C7C64A8F}" type="presOf" srcId="{BA912062-20F7-704B-ACFE-C7F4611D2B80}" destId="{E7BC0599-A551-9145-BAAF-3D63AC07E5B0}" srcOrd="0" destOrd="0" presId="urn:microsoft.com/office/officeart/2005/8/layout/orgChart1"/>
+    <dgm:cxn modelId="{769BA709-86A8-E949-9D05-0ED874A4C482}" type="presOf" srcId="{F3CC7960-1B33-8A42-856B-8E6105617BC9}" destId="{CD9E414E-FA12-3B4E-A293-4BB4EF210DF3}" srcOrd="0" destOrd="0" presId="urn:microsoft.com/office/officeart/2005/8/layout/orgChart1"/>
+    <dgm:cxn modelId="{55AD860C-5E0A-634A-B78C-494B8B3673D2}" type="presOf" srcId="{2DDC1B06-FAEB-6A43-992D-DAD87D34308F}" destId="{BA88FDD8-154F-074F-8264-E4BB7179B08F}" srcOrd="0" destOrd="0" presId="urn:microsoft.com/office/officeart/2005/8/layout/orgChart1"/>
+    <dgm:cxn modelId="{DD6950B4-6F52-1143-8B70-5E0ADD3979B3}" type="presOf" srcId="{24FC4B7B-0304-B442-8D70-451D2E1B8E73}" destId="{9A12DE5A-70C1-804B-9A4B-22524871D7B4}" srcOrd="0" destOrd="0" presId="urn:microsoft.com/office/officeart/2005/8/layout/orgChart1"/>
+    <dgm:cxn modelId="{42A23F76-FCF9-8E47-AB01-F1E8C20E5974}" type="presOf" srcId="{A9A11C6A-3CB2-B746-987C-714C47A8C4E1}" destId="{9B355131-116F-0447-A834-D86B05A650FB}" srcOrd="0" destOrd="0" presId="urn:microsoft.com/office/officeart/2005/8/layout/orgChart1"/>
+    <dgm:cxn modelId="{59AA1461-C489-B448-A956-7244D1C8E592}" srcId="{24FC4B7B-0304-B442-8D70-451D2E1B8E73}" destId="{605B3D90-CD4C-FE46-A788-086A46EEE1EF}" srcOrd="1" destOrd="0" parTransId="{DCBC67D8-FA1C-514C-AC55-5490675193BC}" sibTransId="{2B571011-E176-174F-B687-29A2FDA7132B}"/>
+    <dgm:cxn modelId="{D5731595-72E3-AA4C-A88C-EECC68AE2B0A}" type="presOf" srcId="{CB9B9F47-FA5C-864A-A1CF-8B0C649B2339}" destId="{65463B22-A900-174D-82E7-A80575B7ED99}" srcOrd="0" destOrd="0" presId="urn:microsoft.com/office/officeart/2005/8/layout/orgChart1"/>
+    <dgm:cxn modelId="{7BDEFF39-E6A8-D74F-B0DE-AB402E53AF71}" type="presOf" srcId="{42A887FA-7195-6943-A867-9FC674470843}" destId="{44C1D0F1-3B88-DC4E-97C1-00B658DC6FE1}" srcOrd="0" destOrd="0" presId="urn:microsoft.com/office/officeart/2005/8/layout/orgChart1"/>
+    <dgm:cxn modelId="{0EDA1276-9BB9-C94D-AE88-AAF05A4E741F}" type="presOf" srcId="{8BCD8603-B6B5-A247-A01F-7FA97AF262D7}" destId="{314E274F-E38A-3541-9F26-CD95B045C4D8}" srcOrd="1" destOrd="0" presId="urn:microsoft.com/office/officeart/2005/8/layout/orgChart1"/>
     <dgm:cxn modelId="{E9211D36-F15C-BD49-87FA-D9FE7E4BC6C7}" type="presOf" srcId="{4381C273-1EF1-0D43-8C7B-E4E51B1DD902}" destId="{C8EEE93A-6EFD-C14D-9188-0D2E82613DEB}" srcOrd="0" destOrd="0" presId="urn:microsoft.com/office/officeart/2005/8/layout/orgChart1"/>
+    <dgm:cxn modelId="{26DD6863-35D1-DC4E-A48E-B13828617B44}" srcId="{24FC4B7B-0304-B442-8D70-451D2E1B8E73}" destId="{8BCD8603-B6B5-A247-A01F-7FA97AF262D7}" srcOrd="0" destOrd="0" parTransId="{42A887FA-7195-6943-A867-9FC674470843}" sibTransId="{D183B4D4-9282-564A-A05F-6672E4B63679}"/>
+    <dgm:cxn modelId="{6A539400-853A-9E4E-9B1B-459E2870CE29}" type="presOf" srcId="{24FC4B7B-0304-B442-8D70-451D2E1B8E73}" destId="{87B6E815-DF3A-B945-8518-1F7A40A33D5D}" srcOrd="1" destOrd="0" presId="urn:microsoft.com/office/officeart/2005/8/layout/orgChart1"/>
+    <dgm:cxn modelId="{F342E7AE-DB3B-2244-B205-EFBF4EE1BA8A}" type="presOf" srcId="{BA912062-20F7-704B-ACFE-C7F4611D2B80}" destId="{CF29B20B-B0EE-B04A-B295-D4D8CD5D0B9A}" srcOrd="1" destOrd="0" presId="urn:microsoft.com/office/officeart/2005/8/layout/orgChart1"/>
+    <dgm:cxn modelId="{18A8A8CE-E933-F04A-AB6B-1F88456BFF66}" srcId="{605B3D90-CD4C-FE46-A788-086A46EEE1EF}" destId="{BFDBBE1B-6667-4F48-9D61-32D4398669D2}" srcOrd="0" destOrd="0" parTransId="{8F036DD7-DFCB-3749-8E5A-7BA46F00C9A9}" sibTransId="{A39B834D-301B-D941-89B1-D0551DE493AA}"/>
+    <dgm:cxn modelId="{989005E9-42EB-B74D-AE80-36694744109B}" type="presOf" srcId="{0DE64586-681C-D445-B932-2B051D6DB8CE}" destId="{05D87038-C661-0D4A-B04F-9EE6A0A8FD86}" srcOrd="0" destOrd="0" presId="urn:microsoft.com/office/officeart/2005/8/layout/orgChart1"/>
+    <dgm:cxn modelId="{59F69D93-0DD5-E24E-B9EC-3DEC67E53BDF}" srcId="{0DE64586-681C-D445-B932-2B051D6DB8CE}" destId="{E86B5BDD-6540-834C-BAAD-37B0F3BDCD0F}" srcOrd="0" destOrd="0" parTransId="{6D4129E8-158C-864A-9D5F-18713517342C}" sibTransId="{3ABADBE4-5B12-7843-950A-DBB23D832903}"/>
+    <dgm:cxn modelId="{E51EDF7E-3D6E-7A4F-840C-4E094EDB1F5A}" type="presOf" srcId="{D8D5134D-F215-2C45-9BF5-44F6774A8889}" destId="{43613241-23BD-C843-9C48-A6B6A18AC693}" srcOrd="0" destOrd="0" presId="urn:microsoft.com/office/officeart/2005/8/layout/orgChart1"/>
+    <dgm:cxn modelId="{4B21F0FD-9EB7-D746-ABF9-A3D67458BB8D}" type="presOf" srcId="{8F036DD7-DFCB-3749-8E5A-7BA46F00C9A9}" destId="{53EA0784-B3E2-4D42-90F5-D44F5C3657F3}" srcOrd="0" destOrd="0" presId="urn:microsoft.com/office/officeart/2005/8/layout/orgChart1"/>
+    <dgm:cxn modelId="{1096B610-4D67-4340-AE90-F83C5D3BF423}" type="presOf" srcId="{E86B5BDD-6540-834C-BAAD-37B0F3BDCD0F}" destId="{8ED3A631-A845-3A4E-8A2D-ED0098E5CE49}" srcOrd="0" destOrd="0" presId="urn:microsoft.com/office/officeart/2005/8/layout/orgChart1"/>
+    <dgm:cxn modelId="{E7284897-FC49-AD4E-815A-0B7E2C22690F}" srcId="{24FC4B7B-0304-B442-8D70-451D2E1B8E73}" destId="{FD54C9EA-011A-534D-AE4D-31375457A9F1}" srcOrd="3" destOrd="0" parTransId="{D8D5134D-F215-2C45-9BF5-44F6774A8889}" sibTransId="{EE18BE6E-7A82-E748-8160-F68D70A55AAB}"/>
+    <dgm:cxn modelId="{DD0F02EE-67FB-1343-B378-F8D193C79F5C}" type="presOf" srcId="{F3CC7960-1B33-8A42-856B-8E6105617BC9}" destId="{4A1D3649-314F-E145-A178-C679B577D9A2}" srcOrd="1" destOrd="0" presId="urn:microsoft.com/office/officeart/2005/8/layout/orgChart1"/>
+    <dgm:cxn modelId="{E9EA50AE-A6B7-604D-BFFA-CB2FA371B4A9}" srcId="{24FC4B7B-0304-B442-8D70-451D2E1B8E73}" destId="{0DE64586-681C-D445-B932-2B051D6DB8CE}" srcOrd="4" destOrd="0" parTransId="{E1F9CB79-250C-3D49-BA33-3896053D7BCA}" sibTransId="{98FF4FF8-CEB8-F147-BDA1-A732020E65BF}"/>
+    <dgm:cxn modelId="{F775B57C-B4B4-5845-BB1C-C812BE4B7AB3}" type="presOf" srcId="{CB49E2A9-8328-1A43-94E9-DC1CD1DFEFAC}" destId="{BCBC61BF-CA7D-6C4F-90C5-360BA6FFDBEB}" srcOrd="1" destOrd="0" presId="urn:microsoft.com/office/officeart/2005/8/layout/orgChart1"/>
+    <dgm:cxn modelId="{24C9E657-2C76-A84B-91FD-9624226CA32D}" type="presOf" srcId="{E1F9CB79-250C-3D49-BA33-3896053D7BCA}" destId="{C900DA6C-DF7E-D74B-B469-BE27E9142B5A}" srcOrd="0" destOrd="0" presId="urn:microsoft.com/office/officeart/2005/8/layout/orgChart1"/>
+    <dgm:cxn modelId="{E9D0ACCA-D973-994E-87C3-93CDCFC42C9E}" srcId="{8BCD8603-B6B5-A247-A01F-7FA97AF262D7}" destId="{F3CC7960-1B33-8A42-856B-8E6105617BC9}" srcOrd="0" destOrd="0" parTransId="{37ADC307-162F-764A-B8AA-A2016AEC33E3}" sibTransId="{16586342-8DEE-5A4F-8B38-5DC8217DC429}"/>
+    <dgm:cxn modelId="{84159A28-FDCF-FC43-B6E7-CE45B1A80711}" type="presOf" srcId="{37ADC307-162F-764A-B8AA-A2016AEC33E3}" destId="{302EFB1A-FCDE-1849-8D22-6BFC10F1C7F1}" srcOrd="0" destOrd="0" presId="urn:microsoft.com/office/officeart/2005/8/layout/orgChart1"/>
+    <dgm:cxn modelId="{C8AEEC13-B3E4-6B45-B80E-D53F8C44FD10}" srcId="{8BCD8603-B6B5-A247-A01F-7FA97AF262D7}" destId="{BA912062-20F7-704B-ACFE-C7F4611D2B80}" srcOrd="1" destOrd="0" parTransId="{CB9B9F47-FA5C-864A-A1CF-8B0C649B2339}" sibTransId="{0BF99377-AFE4-7046-8A44-E28521C1FBED}"/>
+    <dgm:cxn modelId="{556C4DAC-A41F-7043-9149-C85590EBDB70}" type="presOf" srcId="{DCBC67D8-FA1C-514C-AC55-5490675193BC}" destId="{E18ACB8B-FAA4-354F-B518-FD6F3D0C0B5D}" srcOrd="0" destOrd="0" presId="urn:microsoft.com/office/officeart/2005/8/layout/orgChart1"/>
+    <dgm:cxn modelId="{C2EA3A2F-6DE7-EC4A-B06E-C89C6C62AC56}" srcId="{4381C273-1EF1-0D43-8C7B-E4E51B1DD902}" destId="{24FC4B7B-0304-B442-8D70-451D2E1B8E73}" srcOrd="0" destOrd="0" parTransId="{36D87A19-0213-B84A-B024-CD04CB532DDC}" sibTransId="{60812A6C-64C5-854D-B608-C6506F297E1C}"/>
+    <dgm:cxn modelId="{EDD6886E-88EC-C847-8FAC-606EF69446F1}" type="presOf" srcId="{BFDBBE1B-6667-4F48-9D61-32D4398669D2}" destId="{D88FD843-58C0-DF40-84F2-9507C6DAC07A}" srcOrd="0" destOrd="0" presId="urn:microsoft.com/office/officeart/2005/8/layout/orgChart1"/>
+    <dgm:cxn modelId="{0C805E6B-4678-2848-9452-6C5580320F6C}" srcId="{FD54C9EA-011A-534D-AE4D-31375457A9F1}" destId="{CB49E2A9-8328-1A43-94E9-DC1CD1DFEFAC}" srcOrd="0" destOrd="0" parTransId="{7637A26C-AD3D-9D45-9081-4C2F551F306B}" sibTransId="{1C990685-9C26-1142-9AC9-85E68A93D715}"/>
+    <dgm:cxn modelId="{D04CF219-3B30-134E-B47F-43C0240C6F22}" type="presOf" srcId="{CB49E2A9-8328-1A43-94E9-DC1CD1DFEFAC}" destId="{DD7EBEE8-6900-FC49-B5A4-B89746C84069}" srcOrd="0" destOrd="0" presId="urn:microsoft.com/office/officeart/2005/8/layout/orgChart1"/>
+    <dgm:cxn modelId="{B6C5C769-46C6-E54F-8B55-5FD98019F2F9}" type="presOf" srcId="{BFDBBE1B-6667-4F48-9D61-32D4398669D2}" destId="{38E6712A-E3D0-A544-B83A-311A227ECA72}" srcOrd="1" destOrd="0" presId="urn:microsoft.com/office/officeart/2005/8/layout/orgChart1"/>
+    <dgm:cxn modelId="{A5D9423D-D97F-5A4F-B6E8-CE361491D14C}" type="presOf" srcId="{6D4129E8-158C-864A-9D5F-18713517342C}" destId="{CA6EC814-6AA0-EC44-93A9-FB9AB2556A53}" srcOrd="0" destOrd="0" presId="urn:microsoft.com/office/officeart/2005/8/layout/orgChart1"/>
+    <dgm:cxn modelId="{F7F28DCF-9B98-7B42-9E70-3A3B73619779}" type="presOf" srcId="{605B3D90-CD4C-FE46-A788-086A46EEE1EF}" destId="{42FF1899-8708-BA44-9E74-2CEFAC954577}" srcOrd="1" destOrd="0" presId="urn:microsoft.com/office/officeart/2005/8/layout/orgChart1"/>
     <dgm:cxn modelId="{DA4B53B5-4201-7A4A-A867-A4D14943DF9C}" type="presOf" srcId="{FD54C9EA-011A-534D-AE4D-31375457A9F1}" destId="{D97149CB-9BBA-BE41-8E74-F1C2F88D859C}" srcOrd="0" destOrd="0" presId="urn:microsoft.com/office/officeart/2005/8/layout/orgChart1"/>
+    <dgm:cxn modelId="{93C8D49B-63D5-E749-9B39-8C1299A1BC00}" type="presOf" srcId="{2EE9FA59-1494-BA43-AF80-705EA5EFAB8A}" destId="{82336156-4F11-C24F-AF24-E64E6B66EC9A}" srcOrd="0" destOrd="0" presId="urn:microsoft.com/office/officeart/2005/8/layout/orgChart1"/>
+    <dgm:cxn modelId="{16E4EFA8-0AEF-E441-B44E-D5F6BE4B30F6}" type="presOf" srcId="{0DE64586-681C-D445-B932-2B051D6DB8CE}" destId="{AD45F30E-9BF2-3448-BA0A-2C35EE6C5BCB}" srcOrd="1" destOrd="0" presId="urn:microsoft.com/office/officeart/2005/8/layout/orgChart1"/>
+    <dgm:cxn modelId="{9F179B90-21AE-5E45-A22B-889593D88E3A}" type="presOf" srcId="{7637A26C-AD3D-9D45-9081-4C2F551F306B}" destId="{7DD26E81-1196-1145-B8C9-A25DFDAFF039}" srcOrd="0" destOrd="0" presId="urn:microsoft.com/office/officeart/2005/8/layout/orgChart1"/>
+    <dgm:cxn modelId="{4E612BE7-73FD-764E-9A96-E1DCA5E3C2A2}" srcId="{1767A8FE-7DA6-7E4C-887E-346CB8179756}" destId="{2EE9FA59-1494-BA43-AF80-705EA5EFAB8A}" srcOrd="0" destOrd="0" parTransId="{A9A11C6A-3CB2-B746-987C-714C47A8C4E1}" sibTransId="{F6454B45-8447-7D47-A32B-92306A5ACE4C}"/>
     <dgm:cxn modelId="{90D72E97-2487-3D4F-8684-FF2DCE0035D9}" type="presOf" srcId="{E86B5BDD-6540-834C-BAAD-37B0F3BDCD0F}" destId="{E8E90852-2BB9-C040-A342-F9FA3AA2C233}" srcOrd="1" destOrd="0" presId="urn:microsoft.com/office/officeart/2005/8/layout/orgChart1"/>
-    <dgm:cxn modelId="{F7F28DCF-9B98-7B42-9E70-3A3B73619779}" type="presOf" srcId="{605B3D90-CD4C-FE46-A788-086A46EEE1EF}" destId="{42FF1899-8708-BA44-9E74-2CEFAC954577}" srcOrd="1" destOrd="0" presId="urn:microsoft.com/office/officeart/2005/8/layout/orgChart1"/>
-    <dgm:cxn modelId="{9F179B90-21AE-5E45-A22B-889593D88E3A}" type="presOf" srcId="{7637A26C-AD3D-9D45-9081-4C2F551F306B}" destId="{7DD26E81-1196-1145-B8C9-A25DFDAFF039}" srcOrd="0" destOrd="0" presId="urn:microsoft.com/office/officeart/2005/8/layout/orgChart1"/>
-    <dgm:cxn modelId="{59F69D93-0DD5-E24E-B9EC-3DEC67E53BDF}" srcId="{0DE64586-681C-D445-B932-2B051D6DB8CE}" destId="{E86B5BDD-6540-834C-BAAD-37B0F3BDCD0F}" srcOrd="0" destOrd="0" parTransId="{6D4129E8-158C-864A-9D5F-18713517342C}" sibTransId="{3ABADBE4-5B12-7843-950A-DBB23D832903}"/>
-    <dgm:cxn modelId="{4E612BE7-73FD-764E-9A96-E1DCA5E3C2A2}" srcId="{1767A8FE-7DA6-7E4C-887E-346CB8179756}" destId="{2EE9FA59-1494-BA43-AF80-705EA5EFAB8A}" srcOrd="0" destOrd="0" parTransId="{A9A11C6A-3CB2-B746-987C-714C47A8C4E1}" sibTransId="{F6454B45-8447-7D47-A32B-92306A5ACE4C}"/>
-    <dgm:cxn modelId="{84159A28-FDCF-FC43-B6E7-CE45B1A80711}" type="presOf" srcId="{37ADC307-162F-764A-B8AA-A2016AEC33E3}" destId="{302EFB1A-FCDE-1849-8D22-6BFC10F1C7F1}" srcOrd="0" destOrd="0" presId="urn:microsoft.com/office/officeart/2005/8/layout/orgChart1"/>
-    <dgm:cxn modelId="{24C9E657-2C76-A84B-91FD-9624226CA32D}" type="presOf" srcId="{E1F9CB79-250C-3D49-BA33-3896053D7BCA}" destId="{C900DA6C-DF7E-D74B-B469-BE27E9142B5A}" srcOrd="0" destOrd="0" presId="urn:microsoft.com/office/officeart/2005/8/layout/orgChart1"/>
-    <dgm:cxn modelId="{4B21F0FD-9EB7-D746-ABF9-A3D67458BB8D}" type="presOf" srcId="{8F036DD7-DFCB-3749-8E5A-7BA46F00C9A9}" destId="{53EA0784-B3E2-4D42-90F5-D44F5C3657F3}" srcOrd="0" destOrd="0" presId="urn:microsoft.com/office/officeart/2005/8/layout/orgChart1"/>
-    <dgm:cxn modelId="{989005E9-42EB-B74D-AE80-36694744109B}" type="presOf" srcId="{0DE64586-681C-D445-B932-2B051D6DB8CE}" destId="{05D87038-C661-0D4A-B04F-9EE6A0A8FD86}" srcOrd="0" destOrd="0" presId="urn:microsoft.com/office/officeart/2005/8/layout/orgChart1"/>
-    <dgm:cxn modelId="{556C4DAC-A41F-7043-9149-C85590EBDB70}" type="presOf" srcId="{DCBC67D8-FA1C-514C-AC55-5490675193BC}" destId="{E18ACB8B-FAA4-354F-B518-FD6F3D0C0B5D}" srcOrd="0" destOrd="0" presId="urn:microsoft.com/office/officeart/2005/8/layout/orgChart1"/>
-    <dgm:cxn modelId="{D5731595-72E3-AA4C-A88C-EECC68AE2B0A}" type="presOf" srcId="{CB9B9F47-FA5C-864A-A1CF-8B0C649B2339}" destId="{65463B22-A900-174D-82E7-A80575B7ED99}" srcOrd="0" destOrd="0" presId="urn:microsoft.com/office/officeart/2005/8/layout/orgChart1"/>
-    <dgm:cxn modelId="{769BA709-86A8-E949-9D05-0ED874A4C482}" type="presOf" srcId="{F3CC7960-1B33-8A42-856B-8E6105617BC9}" destId="{CD9E414E-FA12-3B4E-A293-4BB4EF210DF3}" srcOrd="0" destOrd="0" presId="urn:microsoft.com/office/officeart/2005/8/layout/orgChart1"/>
-    <dgm:cxn modelId="{6A539400-853A-9E4E-9B1B-459E2870CE29}" type="presOf" srcId="{24FC4B7B-0304-B442-8D70-451D2E1B8E73}" destId="{87B6E815-DF3A-B945-8518-1F7A40A33D5D}" srcOrd="1" destOrd="0" presId="urn:microsoft.com/office/officeart/2005/8/layout/orgChart1"/>
-    <dgm:cxn modelId="{926EB50A-7DCD-C547-B453-FAC73F176245}" type="presOf" srcId="{8BCD8603-B6B5-A247-A01F-7FA97AF262D7}" destId="{BF32D8EB-9D41-6C42-A5DA-166765D5458D}" srcOrd="0" destOrd="0" presId="urn:microsoft.com/office/officeart/2005/8/layout/orgChart1"/>
-    <dgm:cxn modelId="{4D72B0DD-1AE7-1845-A919-9471C7C64A8F}" type="presOf" srcId="{BA912062-20F7-704B-ACFE-C7F4611D2B80}" destId="{E7BC0599-A551-9145-BAAF-3D63AC07E5B0}" srcOrd="0" destOrd="0" presId="urn:microsoft.com/office/officeart/2005/8/layout/orgChart1"/>
-    <dgm:cxn modelId="{0C805E6B-4678-2848-9452-6C5580320F6C}" srcId="{FD54C9EA-011A-534D-AE4D-31375457A9F1}" destId="{CB49E2A9-8328-1A43-94E9-DC1CD1DFEFAC}" srcOrd="0" destOrd="0" parTransId="{7637A26C-AD3D-9D45-9081-4C2F551F306B}" sibTransId="{1C990685-9C26-1142-9AC9-85E68A93D715}"/>
-    <dgm:cxn modelId="{06C45E1D-83BF-944D-A305-69D6467FCECF}" type="presOf" srcId="{1767A8FE-7DA6-7E4C-887E-346CB8179756}" destId="{516267D5-8BC8-6B43-941A-85AC1C9C19A6}" srcOrd="0" destOrd="0" presId="urn:microsoft.com/office/officeart/2005/8/layout/orgChart1"/>
-    <dgm:cxn modelId="{E63139CD-26DF-CB42-9132-40109218E780}" type="presOf" srcId="{1767A8FE-7DA6-7E4C-887E-346CB8179756}" destId="{4AA15F4B-8DC5-CC44-8FB8-A0FA95AA20B0}" srcOrd="1" destOrd="0" presId="urn:microsoft.com/office/officeart/2005/8/layout/orgChart1"/>
-    <dgm:cxn modelId="{DD0F02EE-67FB-1343-B378-F8D193C79F5C}" type="presOf" srcId="{F3CC7960-1B33-8A42-856B-8E6105617BC9}" destId="{4A1D3649-314F-E145-A178-C679B577D9A2}" srcOrd="1" destOrd="0" presId="urn:microsoft.com/office/officeart/2005/8/layout/orgChart1"/>
-    <dgm:cxn modelId="{42A23F76-FCF9-8E47-AB01-F1E8C20E5974}" type="presOf" srcId="{A9A11C6A-3CB2-B746-987C-714C47A8C4E1}" destId="{9B355131-116F-0447-A834-D86B05A650FB}" srcOrd="0" destOrd="0" presId="urn:microsoft.com/office/officeart/2005/8/layout/orgChart1"/>
-    <dgm:cxn modelId="{4B4AAD8F-E5A0-DA48-B301-472AEBDBC7FB}" srcId="{24FC4B7B-0304-B442-8D70-451D2E1B8E73}" destId="{1767A8FE-7DA6-7E4C-887E-346CB8179756}" srcOrd="2" destOrd="0" parTransId="{2DDC1B06-FAEB-6A43-992D-DAD87D34308F}" sibTransId="{DFB1E95F-91DF-774E-9B05-080225A4EB9C}"/>
-    <dgm:cxn modelId="{93C8D49B-63D5-E749-9B39-8C1299A1BC00}" type="presOf" srcId="{2EE9FA59-1494-BA43-AF80-705EA5EFAB8A}" destId="{82336156-4F11-C24F-AF24-E64E6B66EC9A}" srcOrd="0" destOrd="0" presId="urn:microsoft.com/office/officeart/2005/8/layout/orgChart1"/>
-    <dgm:cxn modelId="{C2EA3A2F-6DE7-EC4A-B06E-C89C6C62AC56}" srcId="{4381C273-1EF1-0D43-8C7B-E4E51B1DD902}" destId="{24FC4B7B-0304-B442-8D70-451D2E1B8E73}" srcOrd="0" destOrd="0" parTransId="{36D87A19-0213-B84A-B024-CD04CB532DDC}" sibTransId="{60812A6C-64C5-854D-B608-C6506F297E1C}"/>
-    <dgm:cxn modelId="{DD6950B4-6F52-1143-8B70-5E0ADD3979B3}" type="presOf" srcId="{24FC4B7B-0304-B442-8D70-451D2E1B8E73}" destId="{9A12DE5A-70C1-804B-9A4B-22524871D7B4}" srcOrd="0" destOrd="0" presId="urn:microsoft.com/office/officeart/2005/8/layout/orgChart1"/>
-    <dgm:cxn modelId="{47581894-442F-E647-B01B-641FBD6FC933}" type="presOf" srcId="{FD54C9EA-011A-534D-AE4D-31375457A9F1}" destId="{ECCBBBF4-F9C9-BE47-ABAF-C182918AA8F9}" srcOrd="1" destOrd="0" presId="urn:microsoft.com/office/officeart/2005/8/layout/orgChart1"/>
-    <dgm:cxn modelId="{59AA1461-C489-B448-A956-7244D1C8E592}" srcId="{24FC4B7B-0304-B442-8D70-451D2E1B8E73}" destId="{605B3D90-CD4C-FE46-A788-086A46EEE1EF}" srcOrd="1" destOrd="0" parTransId="{DCBC67D8-FA1C-514C-AC55-5490675193BC}" sibTransId="{2B571011-E176-174F-B687-29A2FDA7132B}"/>
-    <dgm:cxn modelId="{F342E7AE-DB3B-2244-B205-EFBF4EE1BA8A}" type="presOf" srcId="{BA912062-20F7-704B-ACFE-C7F4611D2B80}" destId="{CF29B20B-B0EE-B04A-B295-D4D8CD5D0B9A}" srcOrd="1" destOrd="0" presId="urn:microsoft.com/office/officeart/2005/8/layout/orgChart1"/>
-    <dgm:cxn modelId="{A5D9423D-D97F-5A4F-B6E8-CE361491D14C}" type="presOf" srcId="{6D4129E8-158C-864A-9D5F-18713517342C}" destId="{CA6EC814-6AA0-EC44-93A9-FB9AB2556A53}" srcOrd="0" destOrd="0" presId="urn:microsoft.com/office/officeart/2005/8/layout/orgChart1"/>
-    <dgm:cxn modelId="{0EDA1276-9BB9-C94D-AE88-AAF05A4E741F}" type="presOf" srcId="{8BCD8603-B6B5-A247-A01F-7FA97AF262D7}" destId="{314E274F-E38A-3541-9F26-CD95B045C4D8}" srcOrd="1" destOrd="0" presId="urn:microsoft.com/office/officeart/2005/8/layout/orgChart1"/>
-    <dgm:cxn modelId="{09A8B472-6259-7E4E-A66B-24776F2E6E85}" type="presOf" srcId="{2EE9FA59-1494-BA43-AF80-705EA5EFAB8A}" destId="{BA486349-E536-5540-AB6E-2424986D4063}" srcOrd="1" destOrd="0" presId="urn:microsoft.com/office/officeart/2005/8/layout/orgChart1"/>
-    <dgm:cxn modelId="{C8AEEC13-B3E4-6B45-B80E-D53F8C44FD10}" srcId="{8BCD8603-B6B5-A247-A01F-7FA97AF262D7}" destId="{BA912062-20F7-704B-ACFE-C7F4611D2B80}" srcOrd="1" destOrd="0" parTransId="{CB9B9F47-FA5C-864A-A1CF-8B0C649B2339}" sibTransId="{0BF99377-AFE4-7046-8A44-E28521C1FBED}"/>
-    <dgm:cxn modelId="{7BDEFF39-E6A8-D74F-B0DE-AB402E53AF71}" type="presOf" srcId="{42A887FA-7195-6943-A867-9FC674470843}" destId="{44C1D0F1-3B88-DC4E-97C1-00B658DC6FE1}" srcOrd="0" destOrd="0" presId="urn:microsoft.com/office/officeart/2005/8/layout/orgChart1"/>
-    <dgm:cxn modelId="{D04CF219-3B30-134E-B47F-43C0240C6F22}" type="presOf" srcId="{CB49E2A9-8328-1A43-94E9-DC1CD1DFEFAC}" destId="{DD7EBEE8-6900-FC49-B5A4-B89746C84069}" srcOrd="0" destOrd="0" presId="urn:microsoft.com/office/officeart/2005/8/layout/orgChart1"/>
-    <dgm:cxn modelId="{E9D0ACCA-D973-994E-87C3-93CDCFC42C9E}" srcId="{8BCD8603-B6B5-A247-A01F-7FA97AF262D7}" destId="{F3CC7960-1B33-8A42-856B-8E6105617BC9}" srcOrd="0" destOrd="0" parTransId="{37ADC307-162F-764A-B8AA-A2016AEC33E3}" sibTransId="{16586342-8DEE-5A4F-8B38-5DC8217DC429}"/>
-    <dgm:cxn modelId="{EDD6886E-88EC-C847-8FAC-606EF69446F1}" type="presOf" srcId="{BFDBBE1B-6667-4F48-9D61-32D4398669D2}" destId="{D88FD843-58C0-DF40-84F2-9507C6DAC07A}" srcOrd="0" destOrd="0" presId="urn:microsoft.com/office/officeart/2005/8/layout/orgChart1"/>
-    <dgm:cxn modelId="{F775B57C-B4B4-5845-BB1C-C812BE4B7AB3}" type="presOf" srcId="{CB49E2A9-8328-1A43-94E9-DC1CD1DFEFAC}" destId="{BCBC61BF-CA7D-6C4F-90C5-360BA6FFDBEB}" srcOrd="1" destOrd="0" presId="urn:microsoft.com/office/officeart/2005/8/layout/orgChart1"/>
-    <dgm:cxn modelId="{26DD6863-35D1-DC4E-A48E-B13828617B44}" srcId="{24FC4B7B-0304-B442-8D70-451D2E1B8E73}" destId="{8BCD8603-B6B5-A247-A01F-7FA97AF262D7}" srcOrd="0" destOrd="0" parTransId="{42A887FA-7195-6943-A867-9FC674470843}" sibTransId="{D183B4D4-9282-564A-A05F-6672E4B63679}"/>
-    <dgm:cxn modelId="{55AD860C-5E0A-634A-B78C-494B8B3673D2}" type="presOf" srcId="{2DDC1B06-FAEB-6A43-992D-DAD87D34308F}" destId="{BA88FDD8-154F-074F-8264-E4BB7179B08F}" srcOrd="0" destOrd="0" presId="urn:microsoft.com/office/officeart/2005/8/layout/orgChart1"/>
-    <dgm:cxn modelId="{E51EDF7E-3D6E-7A4F-840C-4E094EDB1F5A}" type="presOf" srcId="{D8D5134D-F215-2C45-9BF5-44F6774A8889}" destId="{43613241-23BD-C843-9C48-A6B6A18AC693}" srcOrd="0" destOrd="0" presId="urn:microsoft.com/office/officeart/2005/8/layout/orgChart1"/>
-    <dgm:cxn modelId="{18A8A8CE-E933-F04A-AB6B-1F88456BFF66}" srcId="{605B3D90-CD4C-FE46-A788-086A46EEE1EF}" destId="{BFDBBE1B-6667-4F48-9D61-32D4398669D2}" srcOrd="0" destOrd="0" parTransId="{8F036DD7-DFCB-3749-8E5A-7BA46F00C9A9}" sibTransId="{A39B834D-301B-D941-89B1-D0551DE493AA}"/>
-    <dgm:cxn modelId="{B6C5C769-46C6-E54F-8B55-5FD98019F2F9}" type="presOf" srcId="{BFDBBE1B-6667-4F48-9D61-32D4398669D2}" destId="{38E6712A-E3D0-A544-B83A-311A227ECA72}" srcOrd="1" destOrd="0" presId="urn:microsoft.com/office/officeart/2005/8/layout/orgChart1"/>
-    <dgm:cxn modelId="{E7284897-FC49-AD4E-815A-0B7E2C22690F}" srcId="{24FC4B7B-0304-B442-8D70-451D2E1B8E73}" destId="{FD54C9EA-011A-534D-AE4D-31375457A9F1}" srcOrd="3" destOrd="0" parTransId="{D8D5134D-F215-2C45-9BF5-44F6774A8889}" sibTransId="{EE18BE6E-7A82-E748-8160-F68D70A55AAB}"/>
-    <dgm:cxn modelId="{E3016297-1490-E04B-9930-9DEE63D2F6CF}" type="presOf" srcId="{605B3D90-CD4C-FE46-A788-086A46EEE1EF}" destId="{DDAE6EA9-32C1-4A49-8282-526E58DB176B}" srcOrd="0" destOrd="0" presId="urn:microsoft.com/office/officeart/2005/8/layout/orgChart1"/>
-    <dgm:cxn modelId="{1096B610-4D67-4340-AE90-F83C5D3BF423}" type="presOf" srcId="{E86B5BDD-6540-834C-BAAD-37B0F3BDCD0F}" destId="{8ED3A631-A845-3A4E-8A2D-ED0098E5CE49}" srcOrd="0" destOrd="0" presId="urn:microsoft.com/office/officeart/2005/8/layout/orgChart1"/>
-    <dgm:cxn modelId="{E9EA50AE-A6B7-604D-BFFA-CB2FA371B4A9}" srcId="{24FC4B7B-0304-B442-8D70-451D2E1B8E73}" destId="{0DE64586-681C-D445-B932-2B051D6DB8CE}" srcOrd="4" destOrd="0" parTransId="{E1F9CB79-250C-3D49-BA33-3896053D7BCA}" sibTransId="{98FF4FF8-CEB8-F147-BDA1-A732020E65BF}"/>
-    <dgm:cxn modelId="{16E4EFA8-0AEF-E441-B44E-D5F6BE4B30F6}" type="presOf" srcId="{0DE64586-681C-D445-B932-2B051D6DB8CE}" destId="{AD45F30E-9BF2-3448-BA0A-2C35EE6C5BCB}" srcOrd="1" destOrd="0" presId="urn:microsoft.com/office/officeart/2005/8/layout/orgChart1"/>
     <dgm:cxn modelId="{C9DB3C6E-DFA3-9449-9C25-5665707F4ADA}" type="presParOf" srcId="{C8EEE93A-6EFD-C14D-9188-0D2E82613DEB}" destId="{5FC30987-B60B-7644-A79F-5E84F050918F}" srcOrd="0" destOrd="0" presId="urn:microsoft.com/office/officeart/2005/8/layout/orgChart1"/>
     <dgm:cxn modelId="{E132551C-F965-C94F-BB22-D20A99CCEE4A}" type="presParOf" srcId="{5FC30987-B60B-7644-A79F-5E84F050918F}" destId="{040A6CE4-967E-F544-A604-408C7957679D}" srcOrd="0" destOrd="0" presId="urn:microsoft.com/office/officeart/2005/8/layout/orgChart1"/>
     <dgm:cxn modelId="{A129966A-0372-A445-A1B5-39DDD6883322}" type="presParOf" srcId="{040A6CE4-967E-F544-A604-408C7957679D}" destId="{9A12DE5A-70C1-804B-9A4B-22524871D7B4}" srcOrd="0" destOrd="0" presId="urn:microsoft.com/office/officeart/2005/8/layout/orgChart1"/>
@@ -10415,6 +10415,44 @@
           </a:p>
         </p:txBody>
       </p:sp>
+      <p:sp>
+        <p:nvSpPr>
+          <p:cNvPr id="4" name="TextBox 3"/>
+          <p:cNvSpPr txBox="1"/>
+          <p:nvPr/>
+        </p:nvSpPr>
+        <p:spPr>
+          <a:xfrm>
+            <a:off x="6170706" y="6126163"/>
+            <a:ext cx="2852063" cy="369332"/>
+          </a:xfrm>
+          <a:prstGeom prst="rect">
+            <a:avLst/>
+          </a:prstGeom>
+          <a:noFill/>
+        </p:spPr>
+        <p:txBody>
+          <a:bodyPr wrap="none" rtlCol="0">
+            <a:spAutoFit/>
+          </a:bodyPr>
+          <a:lstStyle/>
+          <a:p>
+            <a:r>
+              <a:rPr lang="en-US" dirty="0" smtClean="0">
+                <a:solidFill>
+                  <a:srgbClr val="FF0000"/>
+                </a:solidFill>
+              </a:rPr>
+              <a:t>Add CA power station attack</a:t>
+            </a:r>
+            <a:endParaRPr lang="en-US" dirty="0">
+              <a:solidFill>
+                <a:srgbClr val="FF0000"/>
+              </a:solidFill>
+            </a:endParaRPr>
+          </a:p>
+        </p:txBody>
+      </p:sp>
     </p:spTree>
     <p:extLst>
       <p:ext uri="{BB962C8B-B14F-4D97-AF65-F5344CB8AC3E}">
@@ -13811,22 +13849,28 @@
       </p:sp>
       <p:pic>
         <p:nvPicPr>
-          <p:cNvPr id="3" name="Picture 2"/>
+          <p:cNvPr id="8" name="Picture 7" descr="image001.jpg"/>
           <p:cNvPicPr>
             <a:picLocks noChangeAspect="1"/>
           </p:cNvPicPr>
           <p:nvPr/>
         </p:nvPicPr>
         <p:blipFill>
-          <a:blip r:embed="rId2"/>
+          <a:blip r:embed="rId2">
+            <a:extLst>
+              <a:ext uri="{28A0092B-C50C-407E-A947-70E740481C1C}">
+                <a14:useLocalDpi xmlns:a14="http://schemas.microsoft.com/office/drawing/2010/main" val="0"/>
+              </a:ext>
+            </a:extLst>
+          </a:blip>
           <a:stretch>
             <a:fillRect/>
           </a:stretch>
         </p:blipFill>
         <p:spPr>
           <a:xfrm>
-            <a:off x="2554917" y="1365398"/>
-            <a:ext cx="4335473" cy="5492601"/>
+            <a:off x="1093127" y="1417638"/>
+            <a:ext cx="7044441" cy="5228783"/>
           </a:xfrm>
           <a:prstGeom prst="rect">
             <a:avLst/>

</xml_diff>